<commit_message>
Updated Materials and Hiring slide
</commit_message>
<xml_diff>
--- a/Crawl Walk Talk_Windows Phone 8.1 App Lifecycle and Speech API.pptx
+++ b/Crawl Walk Talk_Windows Phone 8.1 App Lifecycle and Speech API.pptx
@@ -5,7 +5,7 @@
     <p:sldMasterId id="2147483684" r:id="rId1"/>
   </p:sldMasterIdLst>
   <p:notesMasterIdLst>
-    <p:notesMasterId r:id="rId13"/>
+    <p:notesMasterId r:id="rId12"/>
   </p:notesMasterIdLst>
   <p:sldIdLst>
     <p:sldId id="256" r:id="rId2"/>
@@ -17,8 +17,7 @@
     <p:sldId id="263" r:id="rId8"/>
     <p:sldId id="261" r:id="rId9"/>
     <p:sldId id="262" r:id="rId10"/>
-    <p:sldId id="266" r:id="rId11"/>
-    <p:sldId id="265" r:id="rId12"/>
+    <p:sldId id="265" r:id="rId11"/>
   </p:sldIdLst>
   <p:sldSz cx="9144000" cy="6858000" type="screen4x3"/>
   <p:notesSz cx="6858000" cy="9144000"/>
@@ -218,7 +217,7 @@
           <a:p>
             <a:fld id="{F9B0B765-6EFC-4E67-A609-5A2DD4CB2622}" type="datetimeFigureOut">
               <a:rPr lang="en-US" smtClean="0"/>
-              <a:t>8/20/2014</a:t>
+              <a:t>8/26/2014</a:t>
             </a:fld>
             <a:endParaRPr lang="en-US"/>
           </a:p>
@@ -971,7 +970,7 @@
           <a:p>
             <a:fld id="{49632F88-095D-4088-8021-F9F08FF98970}" type="slidenum">
               <a:rPr lang="en-US" smtClean="0"/>
-              <a:t>11</a:t>
+              <a:t>10</a:t>
             </a:fld>
             <a:endParaRPr lang="en-US"/>
           </a:p>
@@ -3410,136 +3409,6 @@
           <a:chExt cx="0" cy="0"/>
         </a:xfrm>
       </p:grpSpPr>
-      <p:pic>
-        <p:nvPicPr>
-          <p:cNvPr id="7" name="Content Placeholder 6"/>
-          <p:cNvPicPr>
-            <a:picLocks noGrp="1" noChangeAspect="1"/>
-          </p:cNvPicPr>
-          <p:nvPr>
-            <p:ph sz="half" idx="1"/>
-          </p:nvPr>
-        </p:nvPicPr>
-        <p:blipFill>
-          <a:blip r:embed="rId2" cstate="print">
-            <a:extLst>
-              <a:ext uri="{28A0092B-C50C-407E-A947-70E740481C1C}">
-                <a14:useLocalDpi xmlns:a14="http://schemas.microsoft.com/office/drawing/2010/main" val="0"/>
-              </a:ext>
-            </a:extLst>
-          </a:blip>
-          <a:stretch>
-            <a:fillRect/>
-          </a:stretch>
-        </p:blipFill>
-        <p:spPr>
-          <a:xfrm>
-            <a:off x="-609600" y="1600200"/>
-            <a:ext cx="6765418" cy="4495800"/>
-          </a:xfrm>
-          <a:prstGeom prst="rect">
-            <a:avLst/>
-          </a:prstGeom>
-        </p:spPr>
-      </p:pic>
-      <p:sp>
-        <p:nvSpPr>
-          <p:cNvPr id="4" name="Title 3"/>
-          <p:cNvSpPr>
-            <a:spLocks noGrp="1"/>
-          </p:cNvSpPr>
-          <p:nvPr>
-            <p:ph type="title"/>
-          </p:nvPr>
-        </p:nvSpPr>
-        <p:spPr/>
-        <p:txBody>
-          <a:bodyPr/>
-          <a:lstStyle/>
-          <a:p>
-            <a:r>
-              <a:rPr lang="en-US" dirty="0" smtClean="0"/>
-              <a:t>We Want YOU!</a:t>
-            </a:r>
-            <a:endParaRPr lang="en-US" dirty="0"/>
-          </a:p>
-        </p:txBody>
-      </p:sp>
-      <p:sp>
-        <p:nvSpPr>
-          <p:cNvPr id="6" name="Content Placeholder 5"/>
-          <p:cNvSpPr>
-            <a:spLocks noGrp="1"/>
-          </p:cNvSpPr>
-          <p:nvPr>
-            <p:ph sz="half" idx="2"/>
-          </p:nvPr>
-        </p:nvSpPr>
-        <p:spPr>
-          <a:xfrm>
-            <a:off x="3200400" y="1600200"/>
-            <a:ext cx="6096000" cy="4525963"/>
-          </a:xfrm>
-        </p:spPr>
-        <p:txBody>
-          <a:bodyPr/>
-          <a:lstStyle/>
-          <a:p>
-            <a:r>
-              <a:rPr lang="en-US" dirty="0" smtClean="0"/>
-              <a:t>Contact Us</a:t>
-            </a:r>
-          </a:p>
-          <a:p>
-            <a:pPr lvl="1"/>
-            <a:r>
-              <a:rPr lang="en-US" dirty="0" smtClean="0">
-                <a:hlinkClick r:id="rId3"/>
-              </a:rPr>
-              <a:t>findyourcalling@interknowlogy.com</a:t>
-            </a:r>
-            <a:r>
-              <a:rPr lang="en-US" dirty="0" smtClean="0"/>
-              <a:t> mention </a:t>
-            </a:r>
-            <a:r>
-              <a:rPr lang="en-US" dirty="0" err="1" smtClean="0"/>
-              <a:t>devLink</a:t>
-            </a:r>
-            <a:endParaRPr lang="en-US" dirty="0" smtClean="0"/>
-          </a:p>
-        </p:txBody>
-      </p:sp>
-    </p:spTree>
-    <p:extLst>
-      <p:ext uri="{BB962C8B-B14F-4D97-AF65-F5344CB8AC3E}">
-        <p14:creationId xmlns:p14="http://schemas.microsoft.com/office/powerpoint/2010/main" val="2108156130"/>
-      </p:ext>
-    </p:extLst>
-  </p:cSld>
-  <p:clrMapOvr>
-    <a:masterClrMapping/>
-  </p:clrMapOvr>
-</p:sld>
-</file>
-
-<file path=ppt/slides/slide11.xml><?xml version="1.0" encoding="utf-8"?>
-<p:sld xmlns:a="http://schemas.openxmlformats.org/drawingml/2006/main" xmlns:r="http://schemas.openxmlformats.org/officeDocument/2006/relationships" xmlns:p="http://schemas.openxmlformats.org/presentationml/2006/main">
-  <p:cSld>
-    <p:spTree>
-      <p:nvGrpSpPr>
-        <p:cNvPr id="1" name=""/>
-        <p:cNvGrpSpPr/>
-        <p:nvPr/>
-      </p:nvGrpSpPr>
-      <p:grpSpPr>
-        <a:xfrm>
-          <a:off x="0" y="0"/>
-          <a:ext cx="0" cy="0"/>
-          <a:chOff x="0" y="0"/>
-          <a:chExt cx="0" cy="0"/>
-        </a:xfrm>
-      </p:grpSpPr>
       <p:sp>
         <p:nvSpPr>
           <p:cNvPr id="2" name="Title 1"/>
@@ -3573,7 +3442,7 @@
         </p:nvSpPr>
         <p:spPr>
           <a:xfrm>
-            <a:off x="2057400" y="5764768"/>
+            <a:off x="1921018" y="1417638"/>
             <a:ext cx="5301964" cy="369332"/>
           </a:xfrm>
           <a:prstGeom prst="rect">
@@ -3594,6 +3463,305 @@
               <a:t>http://blogs.interknowlogy.com/author/dannywarren/</a:t>
             </a:r>
             <a:endParaRPr lang="en-US" dirty="0"/>
+          </a:p>
+        </p:txBody>
+      </p:sp>
+      <p:sp>
+        <p:nvSpPr>
+          <p:cNvPr id="3" name="Rectangle 2"/>
+          <p:cNvSpPr/>
+          <p:nvPr/>
+        </p:nvSpPr>
+        <p:spPr>
+          <a:xfrm>
+            <a:off x="457200" y="2057400"/>
+            <a:ext cx="8229600" cy="646331"/>
+          </a:xfrm>
+          <a:prstGeom prst="rect">
+            <a:avLst/>
+          </a:prstGeom>
+        </p:spPr>
+        <p:txBody>
+          <a:bodyPr wrap="square">
+            <a:spAutoFit/>
+          </a:bodyPr>
+          <a:lstStyle/>
+          <a:p>
+            <a:pPr algn="ctr"/>
+            <a:r>
+              <a:rPr lang="en-US" dirty="0">
+                <a:hlinkClick r:id="rId4"/>
+              </a:rPr>
+              <a:t>http://blogs.interknowlogy.com/2014/08/26/devlink-crawl-walk-talk-windows-phone-app-lifecycle-and-cortana-api</a:t>
+            </a:r>
+            <a:r>
+              <a:rPr lang="en-US" dirty="0" smtClean="0">
+                <a:hlinkClick r:id="rId4"/>
+              </a:rPr>
+              <a:t>/</a:t>
+            </a:r>
+            <a:r>
+              <a:rPr lang="en-US" dirty="0" smtClean="0"/>
+              <a:t> </a:t>
+            </a:r>
+            <a:endParaRPr lang="en-US" dirty="0"/>
+          </a:p>
+        </p:txBody>
+      </p:sp>
+      <p:sp>
+        <p:nvSpPr>
+          <p:cNvPr id="5" name="Title 3"/>
+          <p:cNvSpPr txBox="1">
+            <a:spLocks/>
+          </p:cNvSpPr>
+          <p:nvPr/>
+        </p:nvSpPr>
+        <p:spPr>
+          <a:xfrm>
+            <a:off x="609600" y="2743200"/>
+            <a:ext cx="8229600" cy="1143000"/>
+          </a:xfrm>
+          <a:prstGeom prst="rect">
+            <a:avLst/>
+          </a:prstGeom>
+        </p:spPr>
+        <p:txBody>
+          <a:bodyPr vert="horz" lIns="91440" tIns="45720" rIns="91440" bIns="45720" rtlCol="0" anchor="ctr">
+            <a:normAutofit/>
+          </a:bodyPr>
+          <a:lstStyle>
+            <a:lvl1pPr algn="ctr" defTabSz="914400" rtl="0" eaLnBrk="1" latinLnBrk="0" hangingPunct="1">
+              <a:spcBef>
+                <a:spcPct val="0"/>
+              </a:spcBef>
+              <a:buNone/>
+              <a:defRPr sz="4400" kern="1200">
+                <a:solidFill>
+                  <a:schemeClr val="tx1">
+                    <a:lumMod val="75000"/>
+                    <a:lumOff val="25000"/>
+                  </a:schemeClr>
+                </a:solidFill>
+                <a:latin typeface="Segoe UI" pitchFamily="34" charset="0"/>
+                <a:ea typeface="Segoe UI" pitchFamily="34" charset="0"/>
+                <a:cs typeface="Segoe UI" pitchFamily="34" charset="0"/>
+              </a:defRPr>
+            </a:lvl1pPr>
+          </a:lstStyle>
+          <a:p>
+            <a:r>
+              <a:rPr lang="en-US" dirty="0" smtClean="0"/>
+              <a:t>We’re Hiring</a:t>
+            </a:r>
+            <a:endParaRPr lang="en-US" dirty="0"/>
+          </a:p>
+        </p:txBody>
+      </p:sp>
+      <p:sp>
+        <p:nvSpPr>
+          <p:cNvPr id="7" name="Content Placeholder 5"/>
+          <p:cNvSpPr txBox="1">
+            <a:spLocks/>
+          </p:cNvSpPr>
+          <p:nvPr/>
+        </p:nvSpPr>
+        <p:spPr>
+          <a:xfrm>
+            <a:off x="609600" y="3886200"/>
+            <a:ext cx="8077200" cy="4525963"/>
+          </a:xfrm>
+          <a:prstGeom prst="rect">
+            <a:avLst/>
+          </a:prstGeom>
+        </p:spPr>
+        <p:txBody>
+          <a:bodyPr/>
+          <a:lstStyle>
+            <a:lvl1pPr marL="342900" indent="-342900" algn="l" defTabSz="914400" rtl="0" eaLnBrk="1" latinLnBrk="0" hangingPunct="1">
+              <a:spcBef>
+                <a:spcPct val="20000"/>
+              </a:spcBef>
+              <a:buFont typeface="Arial" pitchFamily="34" charset="0"/>
+              <a:buChar char="•"/>
+              <a:defRPr sz="3200" kern="1200">
+                <a:solidFill>
+                  <a:schemeClr val="tx1">
+                    <a:lumMod val="65000"/>
+                    <a:lumOff val="35000"/>
+                  </a:schemeClr>
+                </a:solidFill>
+                <a:latin typeface="Segoe UI" pitchFamily="34" charset="0"/>
+                <a:ea typeface="Segoe UI" pitchFamily="34" charset="0"/>
+                <a:cs typeface="Segoe UI" pitchFamily="34" charset="0"/>
+              </a:defRPr>
+            </a:lvl1pPr>
+            <a:lvl2pPr marL="742950" indent="-285750" algn="l" defTabSz="914400" rtl="0" eaLnBrk="1" latinLnBrk="0" hangingPunct="1">
+              <a:spcBef>
+                <a:spcPct val="20000"/>
+              </a:spcBef>
+              <a:buFont typeface="Arial" pitchFamily="34" charset="0"/>
+              <a:buChar char="–"/>
+              <a:defRPr sz="2800" kern="1200">
+                <a:solidFill>
+                  <a:schemeClr val="tx1">
+                    <a:lumMod val="65000"/>
+                    <a:lumOff val="35000"/>
+                  </a:schemeClr>
+                </a:solidFill>
+                <a:latin typeface="Segoe UI" pitchFamily="34" charset="0"/>
+                <a:ea typeface="Segoe UI" pitchFamily="34" charset="0"/>
+                <a:cs typeface="Segoe UI" pitchFamily="34" charset="0"/>
+              </a:defRPr>
+            </a:lvl2pPr>
+            <a:lvl3pPr marL="1143000" indent="-228600" algn="l" defTabSz="914400" rtl="0" eaLnBrk="1" latinLnBrk="0" hangingPunct="1">
+              <a:spcBef>
+                <a:spcPct val="20000"/>
+              </a:spcBef>
+              <a:buFont typeface="Arial" pitchFamily="34" charset="0"/>
+              <a:buChar char="•"/>
+              <a:defRPr sz="2400" kern="1200">
+                <a:solidFill>
+                  <a:schemeClr val="tx1">
+                    <a:lumMod val="65000"/>
+                    <a:lumOff val="35000"/>
+                  </a:schemeClr>
+                </a:solidFill>
+                <a:latin typeface="Segoe UI" pitchFamily="34" charset="0"/>
+                <a:ea typeface="Segoe UI" pitchFamily="34" charset="0"/>
+                <a:cs typeface="Segoe UI" pitchFamily="34" charset="0"/>
+              </a:defRPr>
+            </a:lvl3pPr>
+            <a:lvl4pPr marL="1600200" indent="-228600" algn="l" defTabSz="914400" rtl="0" eaLnBrk="1" latinLnBrk="0" hangingPunct="1">
+              <a:spcBef>
+                <a:spcPct val="20000"/>
+              </a:spcBef>
+              <a:buFont typeface="Arial" pitchFamily="34" charset="0"/>
+              <a:buChar char="–"/>
+              <a:defRPr sz="2000" kern="1200">
+                <a:solidFill>
+                  <a:schemeClr val="tx1">
+                    <a:lumMod val="65000"/>
+                    <a:lumOff val="35000"/>
+                  </a:schemeClr>
+                </a:solidFill>
+                <a:latin typeface="Segoe UI" pitchFamily="34" charset="0"/>
+                <a:ea typeface="Segoe UI" pitchFamily="34" charset="0"/>
+                <a:cs typeface="Segoe UI" pitchFamily="34" charset="0"/>
+              </a:defRPr>
+            </a:lvl4pPr>
+            <a:lvl5pPr marL="2057400" indent="-228600" algn="l" defTabSz="914400" rtl="0" eaLnBrk="1" latinLnBrk="0" hangingPunct="1">
+              <a:spcBef>
+                <a:spcPct val="20000"/>
+              </a:spcBef>
+              <a:buFont typeface="Arial" pitchFamily="34" charset="0"/>
+              <a:buChar char="»"/>
+              <a:defRPr sz="2000" kern="1200">
+                <a:solidFill>
+                  <a:schemeClr val="tx1">
+                    <a:lumMod val="65000"/>
+                    <a:lumOff val="35000"/>
+                  </a:schemeClr>
+                </a:solidFill>
+                <a:latin typeface="Segoe UI" pitchFamily="34" charset="0"/>
+                <a:ea typeface="Segoe UI" pitchFamily="34" charset="0"/>
+                <a:cs typeface="Segoe UI" pitchFamily="34" charset="0"/>
+              </a:defRPr>
+            </a:lvl5pPr>
+            <a:lvl6pPr marL="2514600" indent="-228600" algn="l" defTabSz="914400" rtl="0" eaLnBrk="1" latinLnBrk="0" hangingPunct="1">
+              <a:spcBef>
+                <a:spcPct val="20000"/>
+              </a:spcBef>
+              <a:buFont typeface="Arial" pitchFamily="34" charset="0"/>
+              <a:buChar char="•"/>
+              <a:defRPr sz="2000" kern="1200">
+                <a:solidFill>
+                  <a:schemeClr val="tx1"/>
+                </a:solidFill>
+                <a:latin typeface="+mn-lt"/>
+                <a:ea typeface="+mn-ea"/>
+                <a:cs typeface="+mn-cs"/>
+              </a:defRPr>
+            </a:lvl6pPr>
+            <a:lvl7pPr marL="2971800" indent="-228600" algn="l" defTabSz="914400" rtl="0" eaLnBrk="1" latinLnBrk="0" hangingPunct="1">
+              <a:spcBef>
+                <a:spcPct val="20000"/>
+              </a:spcBef>
+              <a:buFont typeface="Arial" pitchFamily="34" charset="0"/>
+              <a:buChar char="•"/>
+              <a:defRPr sz="2000" kern="1200">
+                <a:solidFill>
+                  <a:schemeClr val="tx1"/>
+                </a:solidFill>
+                <a:latin typeface="+mn-lt"/>
+                <a:ea typeface="+mn-ea"/>
+                <a:cs typeface="+mn-cs"/>
+              </a:defRPr>
+            </a:lvl7pPr>
+            <a:lvl8pPr marL="3429000" indent="-228600" algn="l" defTabSz="914400" rtl="0" eaLnBrk="1" latinLnBrk="0" hangingPunct="1">
+              <a:spcBef>
+                <a:spcPct val="20000"/>
+              </a:spcBef>
+              <a:buFont typeface="Arial" pitchFamily="34" charset="0"/>
+              <a:buChar char="•"/>
+              <a:defRPr sz="2000" kern="1200">
+                <a:solidFill>
+                  <a:schemeClr val="tx1"/>
+                </a:solidFill>
+                <a:latin typeface="+mn-lt"/>
+                <a:ea typeface="+mn-ea"/>
+                <a:cs typeface="+mn-cs"/>
+              </a:defRPr>
+            </a:lvl8pPr>
+            <a:lvl9pPr marL="3886200" indent="-228600" algn="l" defTabSz="914400" rtl="0" eaLnBrk="1" latinLnBrk="0" hangingPunct="1">
+              <a:spcBef>
+                <a:spcPct val="20000"/>
+              </a:spcBef>
+              <a:buFont typeface="Arial" pitchFamily="34" charset="0"/>
+              <a:buChar char="•"/>
+              <a:defRPr sz="2000" kern="1200">
+                <a:solidFill>
+                  <a:schemeClr val="tx1"/>
+                </a:solidFill>
+                <a:latin typeface="+mn-lt"/>
+                <a:ea typeface="+mn-ea"/>
+                <a:cs typeface="+mn-cs"/>
+              </a:defRPr>
+            </a:lvl9pPr>
+          </a:lstStyle>
+          <a:p>
+            <a:pPr marL="0" indent="0" algn="ctr">
+              <a:buNone/>
+            </a:pPr>
+            <a:r>
+              <a:rPr lang="en-US" dirty="0" smtClean="0"/>
+              <a:t>Contact Us and Apply Now</a:t>
+            </a:r>
+          </a:p>
+          <a:p>
+            <a:pPr marL="0" indent="0" algn="ctr">
+              <a:buNone/>
+            </a:pPr>
+            <a:r>
+              <a:rPr lang="en-US" dirty="0" smtClean="0">
+                <a:hlinkClick r:id="rId5"/>
+              </a:rPr>
+              <a:t>findyourcalling@interknowlogy.com</a:t>
+            </a:r>
+            <a:endParaRPr lang="en-US" dirty="0" smtClean="0"/>
+          </a:p>
+          <a:p>
+            <a:pPr marL="0" indent="0" algn="ctr">
+              <a:buNone/>
+            </a:pPr>
+            <a:r>
+              <a:rPr lang="en-US" dirty="0" smtClean="0"/>
+              <a:t>Mention </a:t>
+            </a:r>
+            <a:r>
+              <a:rPr lang="en-US" dirty="0" err="1" smtClean="0"/>
+              <a:t>devLink</a:t>
+            </a:r>
+            <a:endParaRPr lang="en-US" dirty="0" smtClean="0"/>
           </a:p>
         </p:txBody>
       </p:sp>
@@ -3660,10 +3828,15 @@
             <p:ph idx="1"/>
           </p:nvPr>
         </p:nvSpPr>
-        <p:spPr/>
+        <p:spPr>
+          <a:xfrm>
+            <a:off x="457200" y="1600200"/>
+            <a:ext cx="8229600" cy="4724400"/>
+          </a:xfrm>
+        </p:spPr>
         <p:txBody>
           <a:bodyPr>
-            <a:normAutofit fontScale="85000" lnSpcReduction="20000"/>
+            <a:normAutofit fontScale="77500" lnSpcReduction="20000"/>
           </a:bodyPr>
           <a:lstStyle/>
           <a:p>
@@ -3749,8 +3922,28 @@
             <a:pPr lvl="1"/>
             <a:r>
               <a:rPr lang="en-US" dirty="0"/>
-              <a:t>Microsoft MVP in Windows Platform Development</a:t>
-            </a:r>
+              <a:t>Microsoft MVP in Windows Platform </a:t>
+            </a:r>
+            <a:r>
+              <a:rPr lang="en-US" dirty="0" smtClean="0"/>
+              <a:t>Development</a:t>
+            </a:r>
+          </a:p>
+          <a:p>
+            <a:pPr lvl="2"/>
+            <a:r>
+              <a:rPr lang="en-US" dirty="0" smtClean="0"/>
+              <a:t>Since Oct 2013</a:t>
+            </a:r>
+            <a:endParaRPr lang="en-US" dirty="0" smtClean="0"/>
+          </a:p>
+          <a:p>
+            <a:pPr lvl="1"/>
+            <a:r>
+              <a:rPr lang="en-US" dirty="0" smtClean="0"/>
+              <a:t>Former Nokia Champion</a:t>
+            </a:r>
+            <a:endParaRPr lang="en-US" dirty="0"/>
           </a:p>
           <a:p>
             <a:pPr lvl="1"/>
@@ -3758,7 +3951,6 @@
               <a:rPr lang="en-US" dirty="0"/>
               <a:t>Avid Mt. Biker and aspiring Rock Climber</a:t>
             </a:r>
-            <a:endParaRPr lang="en-US" dirty="0"/>
           </a:p>
         </p:txBody>
       </p:sp>
@@ -4289,11 +4481,7 @@
           <a:p>
             <a:r>
               <a:rPr lang="en-US" dirty="0" smtClean="0"/>
-              <a:t>Windows Phone 8.1 </a:t>
-            </a:r>
-            <a:r>
-              <a:rPr lang="en-US" dirty="0" smtClean="0"/>
-              <a:t>Speech API</a:t>
+              <a:t>Windows Phone 8.1 Speech API</a:t>
             </a:r>
             <a:endParaRPr lang="en-US" dirty="0"/>
           </a:p>
@@ -4330,11 +4518,7 @@
             <a:pPr lvl="1"/>
             <a:r>
               <a:rPr lang="en-US" dirty="0" smtClean="0"/>
-              <a:t>Used to Launch </a:t>
-            </a:r>
-            <a:r>
-              <a:rPr lang="en-US" dirty="0" smtClean="0"/>
-              <a:t>Apps</a:t>
+              <a:t>Used to Launch Apps</a:t>
             </a:r>
             <a:endParaRPr lang="en-US" dirty="0"/>
           </a:p>
@@ -4350,7 +4534,6 @@
               <a:rPr lang="en-US" dirty="0" smtClean="0"/>
               <a:t>Grammars</a:t>
             </a:r>
-            <a:endParaRPr lang="en-US" dirty="0" smtClean="0"/>
           </a:p>
           <a:p>
             <a:pPr lvl="1"/>
@@ -4475,11 +4658,7 @@
           <a:p>
             <a:r>
               <a:rPr lang="en-US" dirty="0" smtClean="0"/>
-              <a:t>Update Phrase </a:t>
-            </a:r>
-            <a:r>
-              <a:rPr lang="en-US" dirty="0" smtClean="0"/>
-              <a:t>Lists</a:t>
+              <a:t>Update Phrase Lists</a:t>
             </a:r>
           </a:p>
           <a:p>
@@ -4487,7 +4666,6 @@
               <a:rPr lang="en-US" dirty="0" smtClean="0"/>
               <a:t>Now support dictation variables</a:t>
             </a:r>
-            <a:endParaRPr lang="en-US" dirty="0" smtClean="0"/>
           </a:p>
           <a:p>
             <a:r>

</xml_diff>

<commit_message>
-Fixed materials download link
</commit_message>
<xml_diff>
--- a/Crawl Walk Talk_Windows Phone 8.1 App Lifecycle and Speech API.pptx
+++ b/Crawl Walk Talk_Windows Phone 8.1 App Lifecycle and Speech API.pptx
@@ -217,7 +217,7 @@
           <a:p>
             <a:fld id="{F9B0B765-6EFC-4E67-A609-5A2DD4CB2622}" type="datetimeFigureOut">
               <a:rPr lang="en-US" smtClean="0"/>
-              <a:t>8/26/2014</a:t>
+              <a:t>8/27/2014</a:t>
             </a:fld>
             <a:endParaRPr lang="en-US"/>
           </a:p>
@@ -3475,7 +3475,7 @@
         <p:spPr>
           <a:xfrm>
             <a:off x="457200" y="2057400"/>
-            <a:ext cx="8229600" cy="646331"/>
+            <a:ext cx="8229600" cy="369332"/>
           </a:xfrm>
           <a:prstGeom prst="rect">
             <a:avLst/>
@@ -3492,7 +3492,7 @@
               <a:rPr lang="en-US" dirty="0">
                 <a:hlinkClick r:id="rId4"/>
               </a:rPr>
-              <a:t>http://blogs.interknowlogy.com/2014/08/26/devlink-crawl-walk-talk-windows-phone-app-lifecycle-and-cortana-api</a:t>
+              <a:t>http://blogs.interknowlogy.com/2014/08/26/devlink2014-presentation-materials</a:t>
             </a:r>
             <a:r>
               <a:rPr lang="en-US" dirty="0" smtClean="0">
@@ -3935,7 +3935,6 @@
               <a:rPr lang="en-US" dirty="0" smtClean="0"/>
               <a:t>Since Oct 2013</a:t>
             </a:r>
-            <a:endParaRPr lang="en-US" dirty="0" smtClean="0"/>
           </a:p>
           <a:p>
             <a:pPr lvl="1"/>

</xml_diff>

<commit_message>
-Updated Lifecycle Slide -Added Editable Lifecycle Image
</commit_message>
<xml_diff>
--- a/Crawl Walk Talk_Windows Phone 8.1 App Lifecycle and Speech API.pptx
+++ b/Crawl Walk Talk_Windows Phone 8.1 App Lifecycle and Speech API.pptx
@@ -217,7 +217,7 @@
           <a:p>
             <a:fld id="{F9B0B765-6EFC-4E67-A609-5A2DD4CB2622}" type="datetimeFigureOut">
               <a:rPr lang="en-US" smtClean="0"/>
-              <a:t>8/27/2014</a:t>
+              <a:t>11/19/2014</a:t>
             </a:fld>
             <a:endParaRPr lang="en-US"/>
           </a:p>
@@ -3759,7 +3759,7 @@
             </a:r>
             <a:r>
               <a:rPr lang="en-US" dirty="0" err="1" smtClean="0"/>
-              <a:t>devLink</a:t>
+              <a:t>NEAdNUG</a:t>
             </a:r>
             <a:endParaRPr lang="en-US" dirty="0" smtClean="0"/>
           </a:p>
@@ -4196,8 +4196,43 @@
                   </a:outerShdw>
                 </a:effectLst>
               </a:rPr>
-              <a:t>BAD</a:t>
-            </a:r>
+              <a:t>Sad</a:t>
+            </a:r>
+            <a:endParaRPr lang="en-US" sz="5400" b="1" dirty="0" smtClean="0">
+              <a:ln w="11430"/>
+              <a:gradFill>
+                <a:gsLst>
+                  <a:gs pos="0">
+                    <a:schemeClr val="accent2">
+                      <a:tint val="70000"/>
+                      <a:satMod val="245000"/>
+                    </a:schemeClr>
+                  </a:gs>
+                  <a:gs pos="75000">
+                    <a:schemeClr val="accent2">
+                      <a:tint val="90000"/>
+                      <a:shade val="60000"/>
+                      <a:satMod val="240000"/>
+                    </a:schemeClr>
+                  </a:gs>
+                  <a:gs pos="100000">
+                    <a:schemeClr val="accent2">
+                      <a:tint val="100000"/>
+                      <a:shade val="50000"/>
+                      <a:satMod val="240000"/>
+                    </a:schemeClr>
+                  </a:gs>
+                </a:gsLst>
+                <a:lin ang="5400000"/>
+              </a:gradFill>
+              <a:effectLst>
+                <a:outerShdw blurRad="50800" dist="39000" dir="5460000" algn="tl">
+                  <a:srgbClr val="000000">
+                    <a:alpha val="38000"/>
+                  </a:srgbClr>
+                </a:outerShdw>
+              </a:effectLst>
+            </a:endParaRPr>
           </a:p>
         </p:txBody>
       </p:sp>
@@ -4248,8 +4283,14 @@
                   <a:schemeClr val="accent3"/>
                 </a:solidFill>
               </a:rPr>
-              <a:t>GOOD</a:t>
-            </a:r>
+              <a:t>Happy</a:t>
+            </a:r>
+            <a:endParaRPr lang="en-US" sz="5400" b="1" dirty="0" smtClean="0">
+              <a:ln/>
+              <a:solidFill>
+                <a:schemeClr val="accent3"/>
+              </a:solidFill>
+            </a:endParaRPr>
           </a:p>
         </p:txBody>
       </p:sp>
@@ -4292,9 +4333,9 @@
       </p:grpSpPr>
       <p:pic>
         <p:nvPicPr>
-          <p:cNvPr id="1026" name="Picture 2"/>
+          <p:cNvPr id="13" name="Picture 12"/>
           <p:cNvPicPr>
-            <a:picLocks noChangeAspect="1" noChangeArrowheads="1"/>
+            <a:picLocks noChangeAspect="1"/>
           </p:cNvPicPr>
           <p:nvPr/>
         </p:nvPicPr>
@@ -4306,126 +4347,20 @@
               </a:ext>
             </a:extLst>
           </a:blip>
-          <a:srcRect/>
           <a:stretch>
             <a:fillRect/>
           </a:stretch>
         </p:blipFill>
-        <p:spPr bwMode="auto">
+        <p:spPr>
           <a:xfrm>
-            <a:off x="1295400" y="-11792"/>
-            <a:ext cx="7195294" cy="6869792"/>
+            <a:off x="0" y="0"/>
+            <a:ext cx="9511788" cy="6858000"/>
           </a:xfrm>
           <a:prstGeom prst="rect">
             <a:avLst/>
           </a:prstGeom>
-          <a:noFill/>
-          <a:ln>
-            <a:noFill/>
-          </a:ln>
-          <a:extLst>
-            <a:ext uri="{909E8E84-426E-40DD-AFC4-6F175D3DCCD1}">
-              <a14:hiddenFill xmlns:a14="http://schemas.microsoft.com/office/drawing/2010/main">
-                <a:solidFill>
-                  <a:schemeClr val="accent1"/>
-                </a:solidFill>
-              </a14:hiddenFill>
-            </a:ext>
-            <a:ext uri="{91240B29-F687-4F45-9708-019B960494DF}">
-              <a14:hiddenLine xmlns:a14="http://schemas.microsoft.com/office/drawing/2010/main" w="9525">
-                <a:solidFill>
-                  <a:schemeClr val="tx1"/>
-                </a:solidFill>
-                <a:miter lim="800000"/>
-                <a:headEnd/>
-                <a:tailEnd/>
-              </a14:hiddenLine>
-            </a:ext>
-          </a:extLst>
         </p:spPr>
       </p:pic>
-      <p:sp>
-        <p:nvSpPr>
-          <p:cNvPr id="2" name="Rectangle 1"/>
-          <p:cNvSpPr/>
-          <p:nvPr/>
-        </p:nvSpPr>
-        <p:spPr>
-          <a:xfrm>
-            <a:off x="-228600" y="0"/>
-            <a:ext cx="1600200" cy="6858000"/>
-          </a:xfrm>
-          <a:prstGeom prst="rect">
-            <a:avLst/>
-          </a:prstGeom>
-          <a:ln>
-            <a:noFill/>
-          </a:ln>
-        </p:spPr>
-        <p:style>
-          <a:lnRef idx="2">
-            <a:schemeClr val="accent6"/>
-          </a:lnRef>
-          <a:fillRef idx="1">
-            <a:schemeClr val="lt1"/>
-          </a:fillRef>
-          <a:effectRef idx="0">
-            <a:schemeClr val="accent6"/>
-          </a:effectRef>
-          <a:fontRef idx="minor">
-            <a:schemeClr val="dk1"/>
-          </a:fontRef>
-        </p:style>
-        <p:txBody>
-          <a:bodyPr rtlCol="0" anchor="ctr"/>
-          <a:lstStyle/>
-          <a:p>
-            <a:pPr algn="ctr"/>
-            <a:endParaRPr lang="en-US"/>
-          </a:p>
-        </p:txBody>
-      </p:sp>
-      <p:sp>
-        <p:nvSpPr>
-          <p:cNvPr id="4" name="Rectangle 3"/>
-          <p:cNvSpPr/>
-          <p:nvPr/>
-        </p:nvSpPr>
-        <p:spPr>
-          <a:xfrm>
-            <a:off x="8229600" y="0"/>
-            <a:ext cx="1600200" cy="6858000"/>
-          </a:xfrm>
-          <a:prstGeom prst="rect">
-            <a:avLst/>
-          </a:prstGeom>
-          <a:ln>
-            <a:noFill/>
-          </a:ln>
-        </p:spPr>
-        <p:style>
-          <a:lnRef idx="2">
-            <a:schemeClr val="accent6"/>
-          </a:lnRef>
-          <a:fillRef idx="1">
-            <a:schemeClr val="lt1"/>
-          </a:fillRef>
-          <a:effectRef idx="0">
-            <a:schemeClr val="accent6"/>
-          </a:effectRef>
-          <a:fontRef idx="minor">
-            <a:schemeClr val="dk1"/>
-          </a:fontRef>
-        </p:style>
-        <p:txBody>
-          <a:bodyPr rtlCol="0" anchor="ctr"/>
-          <a:lstStyle/>
-          <a:p>
-            <a:pPr algn="ctr"/>
-            <a:endParaRPr lang="en-US"/>
-          </a:p>
-        </p:txBody>
-      </p:sp>
     </p:spTree>
     <p:extLst>
       <p:ext uri="{BB962C8B-B14F-4D97-AF65-F5344CB8AC3E}">

</xml_diff>